<commit_message>
zusätzliche Dokumente + Text Korrektur
</commit_message>
<xml_diff>
--- a/Data/College Major und Gender Pay Gap.pptx
+++ b/Data/College Major und Gender Pay Gap.pptx
@@ -9,8 +9,8 @@
     <p:sldId id="258" r:id="rId3"/>
     <p:sldId id="264" r:id="rId4"/>
     <p:sldId id="257" r:id="rId5"/>
-    <p:sldId id="265" r:id="rId6"/>
-    <p:sldId id="266" r:id="rId7"/>
+    <p:sldId id="266" r:id="rId6"/>
+    <p:sldId id="265" r:id="rId7"/>
     <p:sldId id="267" r:id="rId8"/>
   </p:sldIdLst>
   <p:sldSz cx="12192000" cy="6858000"/>
@@ -265,7 +265,7 @@
           <a:p>
             <a:fld id="{1776DDF4-E05A-4722-89B9-72E16B8D8938}" type="datetimeFigureOut">
               <a:rPr lang="de-DE" smtClean="0"/>
-              <a:t>05.07.19</a:t>
+              <a:t>06.07.2019</a:t>
             </a:fld>
             <a:endParaRPr lang="de-DE"/>
           </a:p>
@@ -463,7 +463,7 @@
           <a:p>
             <a:fld id="{1776DDF4-E05A-4722-89B9-72E16B8D8938}" type="datetimeFigureOut">
               <a:rPr lang="de-DE" smtClean="0"/>
-              <a:t>05.07.19</a:t>
+              <a:t>06.07.2019</a:t>
             </a:fld>
             <a:endParaRPr lang="de-DE"/>
           </a:p>
@@ -671,7 +671,7 @@
           <a:p>
             <a:fld id="{1776DDF4-E05A-4722-89B9-72E16B8D8938}" type="datetimeFigureOut">
               <a:rPr lang="de-DE" smtClean="0"/>
-              <a:t>05.07.19</a:t>
+              <a:t>06.07.2019</a:t>
             </a:fld>
             <a:endParaRPr lang="de-DE"/>
           </a:p>
@@ -869,7 +869,7 @@
           <a:p>
             <a:fld id="{1776DDF4-E05A-4722-89B9-72E16B8D8938}" type="datetimeFigureOut">
               <a:rPr lang="de-DE" smtClean="0"/>
-              <a:t>05.07.19</a:t>
+              <a:t>06.07.2019</a:t>
             </a:fld>
             <a:endParaRPr lang="de-DE"/>
           </a:p>
@@ -1144,7 +1144,7 @@
           <a:p>
             <a:fld id="{1776DDF4-E05A-4722-89B9-72E16B8D8938}" type="datetimeFigureOut">
               <a:rPr lang="de-DE" smtClean="0"/>
-              <a:t>05.07.19</a:t>
+              <a:t>06.07.2019</a:t>
             </a:fld>
             <a:endParaRPr lang="de-DE"/>
           </a:p>
@@ -1409,7 +1409,7 @@
           <a:p>
             <a:fld id="{1776DDF4-E05A-4722-89B9-72E16B8D8938}" type="datetimeFigureOut">
               <a:rPr lang="de-DE" smtClean="0"/>
-              <a:t>05.07.19</a:t>
+              <a:t>06.07.2019</a:t>
             </a:fld>
             <a:endParaRPr lang="de-DE"/>
           </a:p>
@@ -1821,7 +1821,7 @@
           <a:p>
             <a:fld id="{1776DDF4-E05A-4722-89B9-72E16B8D8938}" type="datetimeFigureOut">
               <a:rPr lang="de-DE" smtClean="0"/>
-              <a:t>05.07.19</a:t>
+              <a:t>06.07.2019</a:t>
             </a:fld>
             <a:endParaRPr lang="de-DE"/>
           </a:p>
@@ -1962,7 +1962,7 @@
           <a:p>
             <a:fld id="{1776DDF4-E05A-4722-89B9-72E16B8D8938}" type="datetimeFigureOut">
               <a:rPr lang="de-DE" smtClean="0"/>
-              <a:t>05.07.19</a:t>
+              <a:t>06.07.2019</a:t>
             </a:fld>
             <a:endParaRPr lang="de-DE"/>
           </a:p>
@@ -2075,7 +2075,7 @@
           <a:p>
             <a:fld id="{1776DDF4-E05A-4722-89B9-72E16B8D8938}" type="datetimeFigureOut">
               <a:rPr lang="de-DE" smtClean="0"/>
-              <a:t>05.07.19</a:t>
+              <a:t>06.07.2019</a:t>
             </a:fld>
             <a:endParaRPr lang="de-DE"/>
           </a:p>
@@ -2386,7 +2386,7 @@
           <a:p>
             <a:fld id="{1776DDF4-E05A-4722-89B9-72E16B8D8938}" type="datetimeFigureOut">
               <a:rPr lang="de-DE" smtClean="0"/>
-              <a:t>05.07.19</a:t>
+              <a:t>06.07.2019</a:t>
             </a:fld>
             <a:endParaRPr lang="de-DE"/>
           </a:p>
@@ -2674,7 +2674,7 @@
           <a:p>
             <a:fld id="{1776DDF4-E05A-4722-89B9-72E16B8D8938}" type="datetimeFigureOut">
               <a:rPr lang="de-DE" smtClean="0"/>
-              <a:t>05.07.19</a:t>
+              <a:t>06.07.2019</a:t>
             </a:fld>
             <a:endParaRPr lang="de-DE"/>
           </a:p>
@@ -2915,7 +2915,7 @@
           <a:p>
             <a:fld id="{1776DDF4-E05A-4722-89B9-72E16B8D8938}" type="datetimeFigureOut">
               <a:rPr lang="de-DE" smtClean="0"/>
-              <a:t>05.07.19</a:t>
+              <a:t>06.07.2019</a:t>
             </a:fld>
             <a:endParaRPr lang="de-DE"/>
           </a:p>
@@ -3756,7 +3756,7 @@
             </a:pPr>
             <a:r>
               <a:rPr lang="de-DE" sz="2800" dirty="0"/>
-              <a:t>Allgemeinheit</a:t>
+              <a:t>Allgemeinbevölkerung</a:t>
             </a:r>
           </a:p>
           <a:p>
@@ -3773,7 +3773,7 @@
             </a:pPr>
             <a:r>
               <a:rPr lang="de-DE" sz="2800" dirty="0"/>
-              <a:t>Fokus: Studierende und Jobeinsteiger (18-28 J.)</a:t>
+              <a:t>Fokus: Schulabsolventen, Studierende und Jobeinsteiger (18-28 J.)</a:t>
             </a:r>
           </a:p>
         </p:txBody>
@@ -4000,7 +4000,7 @@
             </a:pPr>
             <a:r>
               <a:rPr lang="de-DE" dirty="0"/>
-              <a:t>Vollzeit/Teilzeit</a:t>
+              <a:t>Beschäftigungsverhältnis</a:t>
             </a:r>
           </a:p>
           <a:p>
@@ -4053,7 +4053,7 @@
           <p:cNvPr id="2" name="Titel 1">
             <a:extLst>
               <a:ext uri="{FF2B5EF4-FFF2-40B4-BE49-F238E27FC236}">
-                <a16:creationId xmlns:a16="http://schemas.microsoft.com/office/drawing/2014/main" id="{C77969CB-906C-0843-B192-06290B6738EE}"/>
+                <a16:creationId xmlns:a16="http://schemas.microsoft.com/office/drawing/2014/main" id="{4AE64FAC-5701-3343-83AA-1BE8B019DEC7}"/>
               </a:ext>
             </a:extLst>
           </p:cNvPr>
@@ -4071,7 +4071,7 @@
           <a:p>
             <a:r>
               <a:rPr lang="de-DE" dirty="0"/>
-              <a:t>Diagramme</a:t>
+              <a:t>Sprache</a:t>
             </a:r>
           </a:p>
         </p:txBody>
@@ -4081,7 +4081,7 @@
           <p:cNvPr id="3" name="Inhaltsplatzhalter 2">
             <a:extLst>
               <a:ext uri="{FF2B5EF4-FFF2-40B4-BE49-F238E27FC236}">
-                <a16:creationId xmlns:a16="http://schemas.microsoft.com/office/drawing/2014/main" id="{E601ABE9-BD78-A842-B06E-D4F346509C95}"/>
+                <a16:creationId xmlns:a16="http://schemas.microsoft.com/office/drawing/2014/main" id="{A6FE5684-32E4-ED48-BB92-77487277F5F9}"/>
               </a:ext>
             </a:extLst>
           </p:cNvPr>
@@ -4092,78 +4092,106 @@
             <p:ph idx="1"/>
           </p:nvPr>
         </p:nvSpPr>
-        <p:spPr>
-          <a:xfrm>
-            <a:off x="838200" y="1825625"/>
-            <a:ext cx="5586046" cy="4351338"/>
-          </a:xfrm>
-        </p:spPr>
-        <p:txBody>
-          <a:bodyPr/>
+        <p:spPr/>
+        <p:txBody>
+          <a:bodyPr>
+            <a:normAutofit fontScale="62500" lnSpcReduction="20000"/>
+          </a:bodyPr>
           <a:lstStyle/>
           <a:p>
             <a:r>
               <a:rPr lang="de-DE" dirty="0"/>
-              <a:t>Balkendiagramme </a:t>
+              <a:t>Einleitungstexte</a:t>
             </a:r>
           </a:p>
           <a:p>
             <a:r>
               <a:rPr lang="de-DE" dirty="0"/>
-              <a:t>Farbtrennung nach Geschlecht</a:t>
-            </a:r>
-          </a:p>
-          <a:p>
-            <a:pPr lvl="1">
-              <a:buFontTx/>
-              <a:buChar char="-"/>
-            </a:pPr>
+              <a:t>Zwischenfazit</a:t>
+            </a:r>
+          </a:p>
+          <a:p>
             <a:r>
               <a:rPr lang="de-DE" dirty="0"/>
-              <a:t>Rot für weiblich</a:t>
-            </a:r>
-          </a:p>
-          <a:p>
-            <a:pPr lvl="1">
-              <a:buFontTx/>
-              <a:buChar char="-"/>
-            </a:pPr>
-            <a:r>
-              <a:rPr lang="de-DE" dirty="0"/>
-              <a:t>Blau für männlich</a:t>
-            </a:r>
-          </a:p>
-          <a:p>
-            <a:pPr lvl="1">
-              <a:buFontTx/>
-              <a:buChar char="-"/>
-            </a:pPr>
-            <a:r>
-              <a:rPr lang="de-DE" dirty="0"/>
-              <a:t>Diverse Farben für andere Kategorien</a:t>
-            </a:r>
-          </a:p>
-          <a:p>
-            <a:r>
-              <a:rPr lang="de-DE" dirty="0"/>
-              <a:t>Interaktive Tabelle</a:t>
-            </a:r>
-          </a:p>
-          <a:p>
-            <a:pPr lvl="1">
-              <a:buFontTx/>
-              <a:buChar char="-"/>
-            </a:pPr>
-            <a:r>
-              <a:rPr lang="de-DE" dirty="0"/>
-              <a:t>Nutzer soll angeregt werden</a:t>
-            </a:r>
-          </a:p>
-          <a:p>
-            <a:pPr marL="457200" lvl="1" indent="0">
+              <a:t>Fazit</a:t>
+            </a:r>
+          </a:p>
+          <a:p>
+            <a:pPr marL="0" indent="0">
               <a:buNone/>
             </a:pPr>
             <a:endParaRPr lang="de-DE" dirty="0"/>
+          </a:p>
+          <a:p>
+            <a:pPr marL="0" indent="0">
+              <a:buNone/>
+            </a:pPr>
+            <a:r>
+              <a:rPr lang="de-DE" dirty="0"/>
+              <a:t>Stil:</a:t>
+            </a:r>
+          </a:p>
+          <a:p>
+            <a:r>
+              <a:rPr lang="de-DE" dirty="0"/>
+              <a:t>Sprachlich auf Augenhöhe mit der Zielgruppe</a:t>
+            </a:r>
+          </a:p>
+          <a:p>
+            <a:r>
+              <a:rPr lang="de-DE" dirty="0"/>
+              <a:t>Vermeidung von Fachbegriffen</a:t>
+            </a:r>
+          </a:p>
+          <a:p>
+            <a:r>
+              <a:rPr lang="de-DE" dirty="0"/>
+              <a:t>Rückblenden auf vorherige Ergebnisse</a:t>
+            </a:r>
+          </a:p>
+          <a:p>
+            <a:r>
+              <a:rPr lang="de-DE" dirty="0"/>
+              <a:t>Nutzer einbinden („Schauen wir uns das mal genauer an“)</a:t>
+            </a:r>
+          </a:p>
+          <a:p>
+            <a:pPr marL="0" indent="0">
+              <a:buNone/>
+            </a:pPr>
+            <a:endParaRPr lang="de-DE" dirty="0">
+              <a:sym typeface="Wingdings" pitchFamily="2" charset="2"/>
+            </a:endParaRPr>
+          </a:p>
+          <a:p>
+            <a:pPr marL="0" indent="0">
+              <a:buNone/>
+            </a:pPr>
+            <a:r>
+              <a:rPr lang="de-DE" dirty="0">
+                <a:sym typeface="Wingdings" pitchFamily="2" charset="2"/>
+              </a:rPr>
+              <a:t> </a:t>
+            </a:r>
+            <a:r>
+              <a:rPr lang="de-DE" dirty="0"/>
+              <a:t>Dem Nutzer Orientierung bieten und Inhalte zu jedem Zeitpunkt verständlich vermitteln.</a:t>
+            </a:r>
+          </a:p>
+          <a:p>
+            <a:pPr marL="0" indent="0">
+              <a:buNone/>
+            </a:pPr>
+            <a:endParaRPr lang="de-DE" dirty="0"/>
+          </a:p>
+          <a:p>
+            <a:pPr marL="0" indent="0">
+              <a:buNone/>
+            </a:pPr>
+            <a:r>
+              <a:rPr lang="de-DE" dirty="0"/>
+              <a:t>.</a:t>
+            </a:r>
           </a:p>
         </p:txBody>
       </p:sp>
@@ -4172,7 +4200,7 @@
           <p:cNvPr id="5" name="Grafik 4">
             <a:extLst>
               <a:ext uri="{FF2B5EF4-FFF2-40B4-BE49-F238E27FC236}">
-                <a16:creationId xmlns:a16="http://schemas.microsoft.com/office/drawing/2014/main" id="{05D6CCCF-DF43-9F43-96DA-D242361F3CDB}"/>
+                <a16:creationId xmlns:a16="http://schemas.microsoft.com/office/drawing/2014/main" id="{A773D51D-F7B6-E746-B90A-A6502F8F36ED}"/>
               </a:ext>
             </a:extLst>
           </p:cNvPr>
@@ -4195,44 +4223,8 @@
         </p:blipFill>
         <p:spPr>
           <a:xfrm>
-            <a:off x="5661124" y="315258"/>
-            <a:ext cx="5854700" cy="3175000"/>
-          </a:xfrm>
-          <a:prstGeom prst="rect">
-            <a:avLst/>
-          </a:prstGeom>
-        </p:spPr>
-      </p:pic>
-      <p:pic>
-        <p:nvPicPr>
-          <p:cNvPr id="7" name="Grafik 6">
-            <a:extLst>
-              <a:ext uri="{FF2B5EF4-FFF2-40B4-BE49-F238E27FC236}">
-                <a16:creationId xmlns:a16="http://schemas.microsoft.com/office/drawing/2014/main" id="{9B429576-478B-894B-8E77-FE10412CE1E3}"/>
-              </a:ext>
-            </a:extLst>
-          </p:cNvPr>
-          <p:cNvPicPr>
-            <a:picLocks noChangeAspect="1"/>
-          </p:cNvPicPr>
-          <p:nvPr/>
-        </p:nvPicPr>
-        <p:blipFill>
-          <a:blip r:embed="rId3">
-            <a:extLst>
-              <a:ext uri="{28A0092B-C50C-407E-A947-70E740481C1C}">
-                <a14:useLocalDpi xmlns:a14="http://schemas.microsoft.com/office/drawing/2010/main" val="0"/>
-              </a:ext>
-            </a:extLst>
-          </a:blip>
-          <a:stretch>
-            <a:fillRect/>
-          </a:stretch>
-        </p:blipFill>
-        <p:spPr>
-          <a:xfrm>
-            <a:off x="6515903" y="3631730"/>
-            <a:ext cx="4145142" cy="2861145"/>
+            <a:off x="7223685" y="1027906"/>
+            <a:ext cx="2368550" cy="2368550"/>
           </a:xfrm>
           <a:prstGeom prst="rect">
             <a:avLst/>
@@ -4242,7 +4234,7 @@
     </p:spTree>
     <p:extLst>
       <p:ext uri="{BB962C8B-B14F-4D97-AF65-F5344CB8AC3E}">
-        <p14:creationId xmlns:p14="http://schemas.microsoft.com/office/powerpoint/2010/main" val="1481413196"/>
+        <p14:creationId xmlns:p14="http://schemas.microsoft.com/office/powerpoint/2010/main" val="435662422"/>
       </p:ext>
     </p:extLst>
   </p:cSld>
@@ -4274,7 +4266,7 @@
           <p:cNvPr id="2" name="Titel 1">
             <a:extLst>
               <a:ext uri="{FF2B5EF4-FFF2-40B4-BE49-F238E27FC236}">
-                <a16:creationId xmlns:a16="http://schemas.microsoft.com/office/drawing/2014/main" id="{4AE64FAC-5701-3343-83AA-1BE8B019DEC7}"/>
+                <a16:creationId xmlns:a16="http://schemas.microsoft.com/office/drawing/2014/main" id="{C77969CB-906C-0843-B192-06290B6738EE}"/>
               </a:ext>
             </a:extLst>
           </p:cNvPr>
@@ -4292,7 +4284,7 @@
           <a:p>
             <a:r>
               <a:rPr lang="de-DE" dirty="0"/>
-              <a:t>Sprache</a:t>
+              <a:t>Diagramme</a:t>
             </a:r>
           </a:p>
         </p:txBody>
@@ -4302,7 +4294,7 @@
           <p:cNvPr id="3" name="Inhaltsplatzhalter 2">
             <a:extLst>
               <a:ext uri="{FF2B5EF4-FFF2-40B4-BE49-F238E27FC236}">
-                <a16:creationId xmlns:a16="http://schemas.microsoft.com/office/drawing/2014/main" id="{A6FE5684-32E4-ED48-BB92-77487277F5F9}"/>
+                <a16:creationId xmlns:a16="http://schemas.microsoft.com/office/drawing/2014/main" id="{E601ABE9-BD78-A842-B06E-D4F346509C95}"/>
               </a:ext>
             </a:extLst>
           </p:cNvPr>
@@ -4313,106 +4305,78 @@
             <p:ph idx="1"/>
           </p:nvPr>
         </p:nvSpPr>
-        <p:spPr/>
-        <p:txBody>
-          <a:bodyPr>
-            <a:normAutofit fontScale="62500" lnSpcReduction="20000"/>
-          </a:bodyPr>
+        <p:spPr>
+          <a:xfrm>
+            <a:off x="838200" y="1825625"/>
+            <a:ext cx="5586046" cy="4351338"/>
+          </a:xfrm>
+        </p:spPr>
+        <p:txBody>
+          <a:bodyPr/>
           <a:lstStyle/>
           <a:p>
             <a:r>
               <a:rPr lang="de-DE" dirty="0"/>
-              <a:t>Einleitungstexte</a:t>
+              <a:t>Balkendiagramme </a:t>
             </a:r>
           </a:p>
           <a:p>
             <a:r>
               <a:rPr lang="de-DE" dirty="0"/>
-              <a:t>Zwischenfazit</a:t>
-            </a:r>
-          </a:p>
-          <a:p>
+              <a:t>Farbtrennung nach Geschlecht</a:t>
+            </a:r>
+          </a:p>
+          <a:p>
+            <a:pPr lvl="1">
+              <a:buFontTx/>
+              <a:buChar char="-"/>
+            </a:pPr>
             <a:r>
               <a:rPr lang="de-DE" dirty="0"/>
-              <a:t>Fazit</a:t>
-            </a:r>
-          </a:p>
-          <a:p>
-            <a:pPr marL="0" indent="0">
+              <a:t>Rot für weiblich</a:t>
+            </a:r>
+          </a:p>
+          <a:p>
+            <a:pPr lvl="1">
+              <a:buFontTx/>
+              <a:buChar char="-"/>
+            </a:pPr>
+            <a:r>
+              <a:rPr lang="de-DE" dirty="0"/>
+              <a:t>Blau für männlich</a:t>
+            </a:r>
+          </a:p>
+          <a:p>
+            <a:pPr lvl="1">
+              <a:buFontTx/>
+              <a:buChar char="-"/>
+            </a:pPr>
+            <a:r>
+              <a:rPr lang="de-DE" dirty="0"/>
+              <a:t>Diverse Farben für andere Kategorien</a:t>
+            </a:r>
+          </a:p>
+          <a:p>
+            <a:r>
+              <a:rPr lang="de-DE" dirty="0"/>
+              <a:t>Interaktive Tabelle</a:t>
+            </a:r>
+          </a:p>
+          <a:p>
+            <a:pPr lvl="1">
+              <a:buFontTx/>
+              <a:buChar char="-"/>
+            </a:pPr>
+            <a:r>
+              <a:rPr lang="de-DE" dirty="0"/>
+              <a:t>Nutzer soll angeregt werden</a:t>
+            </a:r>
+          </a:p>
+          <a:p>
+            <a:pPr marL="457200" lvl="1" indent="0">
               <a:buNone/>
             </a:pPr>
             <a:endParaRPr lang="de-DE" dirty="0"/>
-          </a:p>
-          <a:p>
-            <a:pPr marL="0" indent="0">
-              <a:buNone/>
-            </a:pPr>
-            <a:r>
-              <a:rPr lang="de-DE" dirty="0"/>
-              <a:t>Stil:</a:t>
-            </a:r>
-          </a:p>
-          <a:p>
-            <a:r>
-              <a:rPr lang="de-DE" dirty="0"/>
-              <a:t>Sprachlich auf Augenhöhe mit der Zielgruppe</a:t>
-            </a:r>
-          </a:p>
-          <a:p>
-            <a:r>
-              <a:rPr lang="de-DE" dirty="0"/>
-              <a:t>Vermeidung von Fachbegriffen</a:t>
-            </a:r>
-          </a:p>
-          <a:p>
-            <a:r>
-              <a:rPr lang="de-DE" dirty="0"/>
-              <a:t>Rückblenden auf vorherige Ergebnisse</a:t>
-            </a:r>
-          </a:p>
-          <a:p>
-            <a:r>
-              <a:rPr lang="de-DE" dirty="0"/>
-              <a:t>Nutzer einbinden („Schauen wir uns das mal genauer an“)</a:t>
-            </a:r>
-          </a:p>
-          <a:p>
-            <a:pPr marL="0" indent="0">
-              <a:buNone/>
-            </a:pPr>
-            <a:endParaRPr lang="de-DE" dirty="0">
-              <a:sym typeface="Wingdings" pitchFamily="2" charset="2"/>
-            </a:endParaRPr>
-          </a:p>
-          <a:p>
-            <a:pPr marL="0" indent="0">
-              <a:buNone/>
-            </a:pPr>
-            <a:r>
-              <a:rPr lang="de-DE" dirty="0">
-                <a:sym typeface="Wingdings" pitchFamily="2" charset="2"/>
-              </a:rPr>
-              <a:t> </a:t>
-            </a:r>
-            <a:r>
-              <a:rPr lang="de-DE" dirty="0"/>
-              <a:t>Dem Nutzer Orientierung bieten und Inhalte zu jedem Zeitpunkt verständlich vermitteln.</a:t>
-            </a:r>
-          </a:p>
-          <a:p>
-            <a:pPr marL="0" indent="0">
-              <a:buNone/>
-            </a:pPr>
-            <a:endParaRPr lang="de-DE" dirty="0"/>
-          </a:p>
-          <a:p>
-            <a:pPr marL="0" indent="0">
-              <a:buNone/>
-            </a:pPr>
-            <a:r>
-              <a:rPr lang="de-DE" dirty="0"/>
-              <a:t>.</a:t>
-            </a:r>
           </a:p>
         </p:txBody>
       </p:sp>
@@ -4421,7 +4385,7 @@
           <p:cNvPr id="5" name="Grafik 4">
             <a:extLst>
               <a:ext uri="{FF2B5EF4-FFF2-40B4-BE49-F238E27FC236}">
-                <a16:creationId xmlns:a16="http://schemas.microsoft.com/office/drawing/2014/main" id="{A773D51D-F7B6-E746-B90A-A6502F8F36ED}"/>
+                <a16:creationId xmlns:a16="http://schemas.microsoft.com/office/drawing/2014/main" id="{05D6CCCF-DF43-9F43-96DA-D242361F3CDB}"/>
               </a:ext>
             </a:extLst>
           </p:cNvPr>
@@ -4444,8 +4408,44 @@
         </p:blipFill>
         <p:spPr>
           <a:xfrm>
-            <a:off x="7223685" y="1027906"/>
-            <a:ext cx="2368550" cy="2368550"/>
+            <a:off x="5661124" y="315258"/>
+            <a:ext cx="5854700" cy="3175000"/>
+          </a:xfrm>
+          <a:prstGeom prst="rect">
+            <a:avLst/>
+          </a:prstGeom>
+        </p:spPr>
+      </p:pic>
+      <p:pic>
+        <p:nvPicPr>
+          <p:cNvPr id="7" name="Grafik 6">
+            <a:extLst>
+              <a:ext uri="{FF2B5EF4-FFF2-40B4-BE49-F238E27FC236}">
+                <a16:creationId xmlns:a16="http://schemas.microsoft.com/office/drawing/2014/main" id="{9B429576-478B-894B-8E77-FE10412CE1E3}"/>
+              </a:ext>
+            </a:extLst>
+          </p:cNvPr>
+          <p:cNvPicPr>
+            <a:picLocks noChangeAspect="1"/>
+          </p:cNvPicPr>
+          <p:nvPr/>
+        </p:nvPicPr>
+        <p:blipFill>
+          <a:blip r:embed="rId3">
+            <a:extLst>
+              <a:ext uri="{28A0092B-C50C-407E-A947-70E740481C1C}">
+                <a14:useLocalDpi xmlns:a14="http://schemas.microsoft.com/office/drawing/2010/main" val="0"/>
+              </a:ext>
+            </a:extLst>
+          </a:blip>
+          <a:stretch>
+            <a:fillRect/>
+          </a:stretch>
+        </p:blipFill>
+        <p:spPr>
+          <a:xfrm>
+            <a:off x="6515903" y="3631730"/>
+            <a:ext cx="4145142" cy="2861145"/>
           </a:xfrm>
           <a:prstGeom prst="rect">
             <a:avLst/>
@@ -4455,7 +4455,7 @@
     </p:spTree>
     <p:extLst>
       <p:ext uri="{BB962C8B-B14F-4D97-AF65-F5344CB8AC3E}">
-        <p14:creationId xmlns:p14="http://schemas.microsoft.com/office/powerpoint/2010/main" val="435662422"/>
+        <p14:creationId xmlns:p14="http://schemas.microsoft.com/office/powerpoint/2010/main" val="1481413196"/>
       </p:ext>
     </p:extLst>
   </p:cSld>

</xml_diff>